<commit_message>
Modified hw9-2 slide 4 (incorrect picture).
</commit_message>
<xml_diff>
--- a/homework/hw9/9-2/hw9-2.pptx
+++ b/homework/hw9/9-2/hw9-2.pptx
@@ -293,7 +293,7 @@
           <a:p>
             <a:fld id="{A73661C9-59F7-4214-9F9B-328BC3B78971}" type="datetimeFigureOut">
               <a:rPr lang="zh-TW" altLang="en-US" smtClean="0"/>
-              <a:t>2014/4/28</a:t>
+              <a:t>2014/4/29</a:t>
             </a:fld>
             <a:endParaRPr lang="zh-TW" altLang="en-US"/>
           </a:p>
@@ -463,7 +463,7 @@
           <a:p>
             <a:fld id="{A73661C9-59F7-4214-9F9B-328BC3B78971}" type="datetimeFigureOut">
               <a:rPr lang="zh-TW" altLang="en-US" smtClean="0"/>
-              <a:t>2014/4/28</a:t>
+              <a:t>2014/4/29</a:t>
             </a:fld>
             <a:endParaRPr lang="zh-TW" altLang="en-US"/>
           </a:p>
@@ -643,7 +643,7 @@
           <a:p>
             <a:fld id="{A73661C9-59F7-4214-9F9B-328BC3B78971}" type="datetimeFigureOut">
               <a:rPr lang="zh-TW" altLang="en-US" smtClean="0"/>
-              <a:t>2014/4/28</a:t>
+              <a:t>2014/4/29</a:t>
             </a:fld>
             <a:endParaRPr lang="zh-TW" altLang="en-US"/>
           </a:p>
@@ -813,7 +813,7 @@
           <a:p>
             <a:fld id="{A73661C9-59F7-4214-9F9B-328BC3B78971}" type="datetimeFigureOut">
               <a:rPr lang="zh-TW" altLang="en-US" smtClean="0"/>
-              <a:t>2014/4/28</a:t>
+              <a:t>2014/4/29</a:t>
             </a:fld>
             <a:endParaRPr lang="zh-TW" altLang="en-US"/>
           </a:p>
@@ -1059,7 +1059,7 @@
           <a:p>
             <a:fld id="{A73661C9-59F7-4214-9F9B-328BC3B78971}" type="datetimeFigureOut">
               <a:rPr lang="zh-TW" altLang="en-US" smtClean="0"/>
-              <a:t>2014/4/28</a:t>
+              <a:t>2014/4/29</a:t>
             </a:fld>
             <a:endParaRPr lang="zh-TW" altLang="en-US"/>
           </a:p>
@@ -1347,7 +1347,7 @@
           <a:p>
             <a:fld id="{A73661C9-59F7-4214-9F9B-328BC3B78971}" type="datetimeFigureOut">
               <a:rPr lang="zh-TW" altLang="en-US" smtClean="0"/>
-              <a:t>2014/4/28</a:t>
+              <a:t>2014/4/29</a:t>
             </a:fld>
             <a:endParaRPr lang="zh-TW" altLang="en-US"/>
           </a:p>
@@ -1769,7 +1769,7 @@
           <a:p>
             <a:fld id="{A73661C9-59F7-4214-9F9B-328BC3B78971}" type="datetimeFigureOut">
               <a:rPr lang="zh-TW" altLang="en-US" smtClean="0"/>
-              <a:t>2014/4/28</a:t>
+              <a:t>2014/4/29</a:t>
             </a:fld>
             <a:endParaRPr lang="zh-TW" altLang="en-US"/>
           </a:p>
@@ -1887,7 +1887,7 @@
           <a:p>
             <a:fld id="{A73661C9-59F7-4214-9F9B-328BC3B78971}" type="datetimeFigureOut">
               <a:rPr lang="zh-TW" altLang="en-US" smtClean="0"/>
-              <a:t>2014/4/28</a:t>
+              <a:t>2014/4/29</a:t>
             </a:fld>
             <a:endParaRPr lang="zh-TW" altLang="en-US"/>
           </a:p>
@@ -1982,7 +1982,7 @@
           <a:p>
             <a:fld id="{A73661C9-59F7-4214-9F9B-328BC3B78971}" type="datetimeFigureOut">
               <a:rPr lang="zh-TW" altLang="en-US" smtClean="0"/>
-              <a:t>2014/4/28</a:t>
+              <a:t>2014/4/29</a:t>
             </a:fld>
             <a:endParaRPr lang="zh-TW" altLang="en-US"/>
           </a:p>
@@ -2259,7 +2259,7 @@
           <a:p>
             <a:fld id="{A73661C9-59F7-4214-9F9B-328BC3B78971}" type="datetimeFigureOut">
               <a:rPr lang="zh-TW" altLang="en-US" smtClean="0"/>
-              <a:t>2014/4/28</a:t>
+              <a:t>2014/4/29</a:t>
             </a:fld>
             <a:endParaRPr lang="zh-TW" altLang="en-US"/>
           </a:p>
@@ -2512,7 +2512,7 @@
           <a:p>
             <a:fld id="{A73661C9-59F7-4214-9F9B-328BC3B78971}" type="datetimeFigureOut">
               <a:rPr lang="zh-TW" altLang="en-US" smtClean="0"/>
-              <a:t>2014/4/28</a:t>
+              <a:t>2014/4/29</a:t>
             </a:fld>
             <a:endParaRPr lang="zh-TW" altLang="en-US"/>
           </a:p>
@@ -2725,7 +2725,7 @@
           <a:p>
             <a:fld id="{A73661C9-59F7-4214-9F9B-328BC3B78971}" type="datetimeFigureOut">
               <a:rPr lang="zh-TW" altLang="en-US" smtClean="0"/>
-              <a:t>2014/4/28</a:t>
+              <a:t>2014/4/29</a:t>
             </a:fld>
             <a:endParaRPr lang="zh-TW" altLang="en-US"/>
           </a:p>
@@ -3522,7 +3522,7 @@
       </p:sp>
       <p:pic>
         <p:nvPicPr>
-          <p:cNvPr id="5" name="Picture 2" descr="D:\102-2\SOFTWARE Engineering Design\homeworks\ntu coffee 2.png"/>
+          <p:cNvPr id="2050" name="Picture 2" descr="D:\102-2\SOFTWARE Engineering Design\homeworks\ntu coffee 2.png"/>
           <p:cNvPicPr>
             <a:picLocks noChangeAspect="1" noChangeArrowheads="1"/>
           </p:cNvPicPr>
@@ -3543,8 +3543,8 @@
         </p:blipFill>
         <p:spPr bwMode="auto">
           <a:xfrm>
-            <a:off x="1691680" y="1556792"/>
-            <a:ext cx="6781800" cy="5695950"/>
+            <a:off x="899592" y="1571624"/>
+            <a:ext cx="7914326" cy="5817815"/>
           </a:xfrm>
           <a:prstGeom prst="rect">
             <a:avLst/>
@@ -3654,11 +3654,7 @@
             </a:r>
             <a:r>
               <a:rPr lang="en-US" altLang="zh-TW" sz="2000" dirty="0" smtClean="0"/>
-              <a:t> </a:t>
-            </a:r>
-            <a:r>
-              <a:rPr lang="en-US" altLang="zh-TW" sz="2000" dirty="0" smtClean="0"/>
-              <a:t>and </a:t>
+              <a:t> and </a:t>
             </a:r>
             <a:r>
               <a:rPr lang="en-US" altLang="zh-TW" sz="2000" b="1" dirty="0" smtClean="0"/>
@@ -3666,15 +3662,7 @@
             </a:r>
             <a:r>
               <a:rPr lang="en-US" altLang="zh-TW" sz="2000" dirty="0" smtClean="0"/>
-              <a:t> </a:t>
-            </a:r>
-            <a:r>
-              <a:rPr lang="en-US" altLang="zh-TW" sz="2000" dirty="0" smtClean="0"/>
-              <a:t>can be </a:t>
-            </a:r>
-            <a:r>
-              <a:rPr lang="en-US" altLang="zh-TW" sz="2000" dirty="0" smtClean="0"/>
-              <a:t>abstracted into an abstract class </a:t>
+              <a:t> can be abstracted into an abstract class </a:t>
             </a:r>
             <a:r>
               <a:rPr lang="en-US" altLang="zh-TW" sz="2000" b="1" dirty="0" smtClean="0"/>

</xml_diff>

<commit_message>
Modified hw9-2 alternate design.
</commit_message>
<xml_diff>
--- a/homework/hw9/9-2/hw9-2.pptx
+++ b/homework/hw9/9-2/hw9-2.pptx
@@ -3803,7 +3803,7 @@
       </p:sp>
       <p:pic>
         <p:nvPicPr>
-          <p:cNvPr id="5122" name="Picture 2" descr="D:\102-2\SOFTWARE Engineering Design\homeworks\ntu coffee shop with order.png"/>
+          <p:cNvPr id="1026" name="Picture 2" descr="D:\102-2\SOFTWARE Engineering Design\homeworks\ntu coffee shop with order.png"/>
           <p:cNvPicPr>
             <a:picLocks noChangeAspect="1" noChangeArrowheads="1"/>
           </p:cNvPicPr>
@@ -3824,8 +3824,8 @@
         </p:blipFill>
         <p:spPr bwMode="auto">
           <a:xfrm>
-            <a:off x="1403648" y="586436"/>
-            <a:ext cx="6912768" cy="6370956"/>
+            <a:off x="1267916" y="548680"/>
+            <a:ext cx="7048500" cy="6486525"/>
           </a:xfrm>
           <a:prstGeom prst="rect">
             <a:avLst/>

</xml_diff>